<commit_message>
ISITIA Signed-off-by: IKA RA <pujakusumae@hotmail.com>
</commit_message>
<xml_diff>
--- a/DOC/SIDANG TESIS/other.pptx
+++ b/DOC/SIDANG TESIS/other.pptx
@@ -13764,7 +13764,7 @@
         <p:spPr>
           <a:xfrm>
             <a:off x="385366" y="3141370"/>
-            <a:ext cx="11421268" cy="646331"/>
+            <a:ext cx="9659179" cy="923330"/>
           </a:xfrm>
           <a:prstGeom prst="rect">
             <a:avLst/>
@@ -13772,7 +13772,7 @@
           <a:noFill/>
         </p:spPr>
         <p:txBody>
-          <a:bodyPr wrap="none" rtlCol="0">
+          <a:bodyPr wrap="square" rtlCol="0">
             <a:spAutoFit/>
           </a:bodyPr>
           <a:lstStyle/>
@@ -14388,8 +14388,8 @@
           <a:chExt cx="0" cy="0"/>
         </a:xfrm>
       </p:grpSpPr>
-      <mc:AlternateContent xmlns:mc="http://schemas.openxmlformats.org/markup-compatibility/2006" xmlns:a14="http://schemas.microsoft.com/office/drawing/2010/main">
-        <mc:Choice Requires="a14">
+      <mc:AlternateContent xmlns:mc="http://schemas.openxmlformats.org/markup-compatibility/2006">
+        <mc:Choice xmlns:a14="http://schemas.microsoft.com/office/drawing/2010/main" Requires="a14">
           <p:sp>
             <p:nvSpPr>
               <p:cNvPr id="3" name="Content Placeholder 2">
@@ -14569,7 +14569,7 @@
               <a:p>
                 <a:r>
                   <a:rPr lang="en-US"/>
-                  <a:t>2. Terdapat kondisi favorable propagation, dimana pada kondisi ini masing-masing veektor kanal untuk tiap user mendekati orthogonal, sehingga user dapat berkomunikasi dengan BTS dengan baik, gangguan dari user lain bisa sangat kecil.</a:t>
+                  <a:t>2. Terdapat kondisi favorable propagation, dimana pada kondisi ini masing-masing vektor kanal untuk tiap user mendekati orthogonal, sehingga user dapat berkomunikasi dengan BTS dengan baik, gangguan dari user lain bisa sangat kecil.</a:t>
                 </a:r>
               </a:p>
               <a:p>
@@ -14578,7 +14578,7 @@
             </p:txBody>
           </p:sp>
         </mc:Choice>
-        <mc:Fallback xmlns="">
+        <mc:Fallback>
           <p:sp>
             <p:nvSpPr>
               <p:cNvPr id="3" name="Content Placeholder 2">

</xml_diff>